<commit_message>
Starting work on Hypothesis Testing module
</commit_message>
<xml_diff>
--- a/modules/Chi_Square/PPT3.pptx
+++ b/modules/Chi_Square/PPT3.pptx
@@ -4381,7 +4381,7 @@
           <a:graphicData uri="http://schemas.openxmlformats.org/presentationml/2006/ole">
             <mc:AlternateContent xmlns:mc="http://schemas.openxmlformats.org/markup-compatibility/2006">
               <mc:Choice xmlns:v="urn:schemas-microsoft-com:vml" Requires="v">
-                <p:oleObj spid="_x0000_s220175" name="Worksheet" r:id="rId3" imgW="2104957" imgH="715979" progId="Excel.Sheet.8">
+                <p:oleObj spid="_x0000_s220177" name="Worksheet" r:id="rId3" imgW="2104957" imgH="715979" progId="Excel.Sheet.8">
                   <p:embed/>
                 </p:oleObj>
               </mc:Choice>
@@ -5391,13 +5391,7 @@
               <a:rPr lang="en-US" sz="3200" dirty="0" smtClean="0">
                 <a:sym typeface="Wingdings" pitchFamily="2" charset="2"/>
               </a:rPr>
-              <a:t>the total row could represent either row</a:t>
-            </a:r>
-            <a:r>
-              <a:rPr lang="en-US" sz="3200" dirty="0" smtClean="0">
-                <a:sym typeface="Wingdings" pitchFamily="2" charset="2"/>
-              </a:rPr>
-              <a:t>.</a:t>
+              <a:t>the total row could represent either row.</a:t>
             </a:r>
             <a:endParaRPr lang="en-US" sz="1600" dirty="0">
               <a:sym typeface="Wingdings" pitchFamily="2" charset="2"/>
@@ -5490,7 +5484,7 @@
           <a:graphicData uri="http://schemas.openxmlformats.org/presentationml/2006/ole">
             <mc:AlternateContent xmlns:mc="http://schemas.openxmlformats.org/markup-compatibility/2006">
               <mc:Choice xmlns:v="urn:schemas-microsoft-com:vml" Requires="v">
-                <p:oleObj spid="_x0000_s221186" name="Worksheet" r:id="rId3" imgW="2104845" imgH="716074" progId="Excel.Sheet.8">
+                <p:oleObj spid="_x0000_s221188" name="Worksheet" r:id="rId3" imgW="2104845" imgH="716074" progId="Excel.Sheet.8">
                   <p:embed/>
                 </p:oleObj>
               </mc:Choice>
@@ -6554,7 +6548,7 @@
           <a:graphicData uri="http://schemas.openxmlformats.org/presentationml/2006/ole">
             <mc:AlternateContent xmlns:mc="http://schemas.openxmlformats.org/markup-compatibility/2006">
               <mc:Choice xmlns:v="urn:schemas-microsoft-com:vml" Requires="v">
-                <p:oleObj spid="_x0000_s204978" name="Equation" r:id="rId3" imgW="596880" imgH="393480" progId="Equation.3">
+                <p:oleObj spid="_x0000_s204986" name="Equation" r:id="rId3" imgW="596880" imgH="393480" progId="Equation.3">
                   <p:embed/>
                 </p:oleObj>
               </mc:Choice>
@@ -6647,7 +6641,7 @@
           <a:graphicData uri="http://schemas.openxmlformats.org/presentationml/2006/ole">
             <mc:AlternateContent xmlns:mc="http://schemas.openxmlformats.org/markup-compatibility/2006">
               <mc:Choice xmlns:v="urn:schemas-microsoft-com:vml" Requires="v">
-                <p:oleObj spid="_x0000_s204979" name="Equation" r:id="rId5" imgW="596880" imgH="393480" progId="Equation.3">
+                <p:oleObj spid="_x0000_s204987" name="Equation" r:id="rId5" imgW="596880" imgH="393480" progId="Equation.3">
                   <p:embed/>
                 </p:oleObj>
               </mc:Choice>
@@ -6740,7 +6734,7 @@
           <a:graphicData uri="http://schemas.openxmlformats.org/presentationml/2006/ole">
             <mc:AlternateContent xmlns:mc="http://schemas.openxmlformats.org/markup-compatibility/2006">
               <mc:Choice xmlns:v="urn:schemas-microsoft-com:vml" Requires="v">
-                <p:oleObj spid="_x0000_s204980" name="Equation" r:id="rId7" imgW="596880" imgH="393480" progId="Equation.3">
+                <p:oleObj spid="_x0000_s204988" name="Equation" r:id="rId7" imgW="596880" imgH="393480" progId="Equation.3">
                   <p:embed/>
                 </p:oleObj>
               </mc:Choice>
@@ -6833,7 +6827,7 @@
           <a:graphicData uri="http://schemas.openxmlformats.org/presentationml/2006/ole">
             <mc:AlternateContent xmlns:mc="http://schemas.openxmlformats.org/markup-compatibility/2006">
               <mc:Choice xmlns:v="urn:schemas-microsoft-com:vml" Requires="v">
-                <p:oleObj spid="_x0000_s204981" name="Equation" r:id="rId9" imgW="596880" imgH="393480" progId="Equation.3">
+                <p:oleObj spid="_x0000_s204989" name="Equation" r:id="rId9" imgW="596880" imgH="393480" progId="Equation.3">
                   <p:embed/>
                 </p:oleObj>
               </mc:Choice>
@@ -7608,7 +7602,7 @@
           <a:graphicData uri="http://schemas.openxmlformats.org/presentationml/2006/ole">
             <mc:AlternateContent xmlns:mc="http://schemas.openxmlformats.org/markup-compatibility/2006">
               <mc:Choice xmlns:v="urn:schemas-microsoft-com:vml" Requires="v">
-                <p:oleObj spid="_x0000_s205914" name="Worksheet" r:id="rId3" imgW="2104845" imgH="716074" progId="Excel.Sheet.8">
+                <p:oleObj spid="_x0000_s205918" name="Worksheet" r:id="rId3" imgW="2104845" imgH="716074" progId="Excel.Sheet.8">
                   <p:embed/>
                 </p:oleObj>
               </mc:Choice>
@@ -7799,7 +7793,7 @@
             <a:graphicData uri="http://schemas.openxmlformats.org/presentationml/2006/ole">
               <mc:AlternateContent xmlns:mc="http://schemas.openxmlformats.org/markup-compatibility/2006">
                 <mc:Choice xmlns:v="urn:schemas-microsoft-com:vml" Requires="v">
-                  <p:oleObj spid="_x0000_s205915" name="Equation" r:id="rId5" imgW="482400" imgH="393480" progId="Equation.3">
+                  <p:oleObj spid="_x0000_s205919" name="Equation" r:id="rId5" imgW="482400" imgH="393480" progId="Equation.3">
                     <p:embed/>
                   </p:oleObj>
                 </mc:Choice>
@@ -8602,7 +8596,7 @@
           <a:graphicData uri="http://schemas.openxmlformats.org/presentationml/2006/ole">
             <mc:AlternateContent xmlns:mc="http://schemas.openxmlformats.org/markup-compatibility/2006">
               <mc:Choice xmlns:v="urn:schemas-microsoft-com:vml" Requires="v">
-                <p:oleObj spid="_x0000_s206936" name="Worksheet" r:id="rId3" imgW="2104845" imgH="716074" progId="Excel.Sheet.8">
+                <p:oleObj spid="_x0000_s206940" name="Worksheet" r:id="rId3" imgW="2104845" imgH="716074" progId="Excel.Sheet.8">
                   <p:embed/>
                 </p:oleObj>
               </mc:Choice>
@@ -8820,7 +8814,7 @@
             <a:graphicData uri="http://schemas.openxmlformats.org/presentationml/2006/ole">
               <mc:AlternateContent xmlns:mc="http://schemas.openxmlformats.org/markup-compatibility/2006">
                 <mc:Choice xmlns:v="urn:schemas-microsoft-com:vml" Requires="v">
-                  <p:oleObj spid="_x0000_s206937" name="Equation" r:id="rId5" imgW="482400" imgH="393480" progId="Equation.3">
+                  <p:oleObj spid="_x0000_s206941" name="Equation" r:id="rId5" imgW="482400" imgH="393480" progId="Equation.3">
                     <p:embed/>
                   </p:oleObj>
                 </mc:Choice>

</xml_diff>